<commit_message>
Add RGB to datatype figure
</commit_message>
<xml_diff>
--- a/figures/resources/data_types.pptx
+++ b/figures/resources/data_types.pptx
@@ -200,7 +200,7 @@
           <a:p>
             <a:fld id="{922FCDE8-9265-274C-B63C-E407950C8DE1}" type="datetimeFigureOut">
               <a:rPr lang="de-DE" smtClean="0"/>
-              <a:t>22.01.21</a:t>
+              <a:t>28.04.25</a:t>
             </a:fld>
             <a:endParaRPr lang="de-DE"/>
           </a:p>
@@ -835,7 +835,7 @@
           <a:p>
             <a:fld id="{747B7DA0-53A4-8447-B8D4-5B08E7A75C15}" type="datetimeFigureOut">
               <a:rPr lang="de-DE" smtClean="0"/>
-              <a:t>22.01.21</a:t>
+              <a:t>28.04.25</a:t>
             </a:fld>
             <a:endParaRPr lang="de-DE"/>
           </a:p>
@@ -1035,7 +1035,7 @@
           <a:p>
             <a:fld id="{747B7DA0-53A4-8447-B8D4-5B08E7A75C15}" type="datetimeFigureOut">
               <a:rPr lang="de-DE" smtClean="0"/>
-              <a:t>22.01.21</a:t>
+              <a:t>28.04.25</a:t>
             </a:fld>
             <a:endParaRPr lang="de-DE"/>
           </a:p>
@@ -1245,7 +1245,7 @@
           <a:p>
             <a:fld id="{747B7DA0-53A4-8447-B8D4-5B08E7A75C15}" type="datetimeFigureOut">
               <a:rPr lang="de-DE" smtClean="0"/>
-              <a:t>22.01.21</a:t>
+              <a:t>28.04.25</a:t>
             </a:fld>
             <a:endParaRPr lang="de-DE"/>
           </a:p>
@@ -2055,7 +2055,7 @@
           <a:p>
             <a:fld id="{747B7DA0-53A4-8447-B8D4-5B08E7A75C15}" type="datetimeFigureOut">
               <a:rPr lang="de-DE" smtClean="0"/>
-              <a:t>22.01.21</a:t>
+              <a:t>28.04.25</a:t>
             </a:fld>
             <a:endParaRPr lang="de-DE"/>
           </a:p>
@@ -2331,7 +2331,7 @@
           <a:p>
             <a:fld id="{747B7DA0-53A4-8447-B8D4-5B08E7A75C15}" type="datetimeFigureOut">
               <a:rPr lang="de-DE" smtClean="0"/>
-              <a:t>22.01.21</a:t>
+              <a:t>28.04.25</a:t>
             </a:fld>
             <a:endParaRPr lang="de-DE"/>
           </a:p>
@@ -2599,7 +2599,7 @@
           <a:p>
             <a:fld id="{747B7DA0-53A4-8447-B8D4-5B08E7A75C15}" type="datetimeFigureOut">
               <a:rPr lang="de-DE" smtClean="0"/>
-              <a:t>22.01.21</a:t>
+              <a:t>28.04.25</a:t>
             </a:fld>
             <a:endParaRPr lang="de-DE"/>
           </a:p>
@@ -3014,7 +3014,7 @@
           <a:p>
             <a:fld id="{747B7DA0-53A4-8447-B8D4-5B08E7A75C15}" type="datetimeFigureOut">
               <a:rPr lang="de-DE" smtClean="0"/>
-              <a:t>22.01.21</a:t>
+              <a:t>28.04.25</a:t>
             </a:fld>
             <a:endParaRPr lang="de-DE"/>
           </a:p>
@@ -3156,7 +3156,7 @@
           <a:p>
             <a:fld id="{747B7DA0-53A4-8447-B8D4-5B08E7A75C15}" type="datetimeFigureOut">
               <a:rPr lang="de-DE" smtClean="0"/>
-              <a:t>22.01.21</a:t>
+              <a:t>28.04.25</a:t>
             </a:fld>
             <a:endParaRPr lang="de-DE"/>
           </a:p>
@@ -3269,7 +3269,7 @@
           <a:p>
             <a:fld id="{747B7DA0-53A4-8447-B8D4-5B08E7A75C15}" type="datetimeFigureOut">
               <a:rPr lang="de-DE" smtClean="0"/>
-              <a:t>22.01.21</a:t>
+              <a:t>28.04.25</a:t>
             </a:fld>
             <a:endParaRPr lang="de-DE"/>
           </a:p>
@@ -3582,7 +3582,7 @@
           <a:p>
             <a:fld id="{747B7DA0-53A4-8447-B8D4-5B08E7A75C15}" type="datetimeFigureOut">
               <a:rPr lang="de-DE" smtClean="0"/>
-              <a:t>22.01.21</a:t>
+              <a:t>28.04.25</a:t>
             </a:fld>
             <a:endParaRPr lang="de-DE"/>
           </a:p>
@@ -3871,7 +3871,7 @@
           <a:p>
             <a:fld id="{747B7DA0-53A4-8447-B8D4-5B08E7A75C15}" type="datetimeFigureOut">
               <a:rPr lang="de-DE" smtClean="0"/>
-              <a:t>22.01.21</a:t>
+              <a:t>28.04.25</a:t>
             </a:fld>
             <a:endParaRPr lang="de-DE"/>
           </a:p>
@@ -4114,7 +4114,7 @@
           <a:p>
             <a:fld id="{747B7DA0-53A4-8447-B8D4-5B08E7A75C15}" type="datetimeFigureOut">
               <a:rPr lang="de-DE" smtClean="0"/>
-              <a:t>22.01.21</a:t>
+              <a:t>28.04.25</a:t>
             </a:fld>
             <a:endParaRPr lang="de-DE"/>
           </a:p>
@@ -4534,60 +4534,20 @@
       </p:grpSpPr>
       <p:sp>
         <p:nvSpPr>
-          <p:cNvPr id="137" name="Google Shape;137;p18"/>
-          <p:cNvSpPr txBox="1">
-            <a:spLocks noGrp="1"/>
-          </p:cNvSpPr>
-          <p:nvPr>
-            <p:ph type="title"/>
-          </p:nvPr>
+          <p:cNvPr id="2" name="TextBox 1">
+            <a:extLst>
+              <a:ext uri="{FF2B5EF4-FFF2-40B4-BE49-F238E27FC236}">
+                <a16:creationId xmlns:a16="http://schemas.microsoft.com/office/drawing/2014/main" id="{1EA846E5-3D55-F441-907F-420B2B28B907}"/>
+              </a:ext>
+            </a:extLst>
+          </p:cNvPr>
+          <p:cNvSpPr txBox="1"/>
+          <p:nvPr/>
         </p:nvSpPr>
         <p:spPr>
           <a:xfrm>
-            <a:off x="2716081" y="129156"/>
-            <a:ext cx="6804837" cy="763650"/>
-          </a:xfrm>
-          <a:prstGeom prst="rect">
-            <a:avLst/>
-          </a:prstGeom>
-          <a:noFill/>
-          <a:ln>
-            <a:noFill/>
-          </a:ln>
-        </p:spPr>
-        <p:txBody>
-          <a:bodyPr spcFirstLastPara="1" vert="horz" wrap="square" lIns="121888" tIns="121888" rIns="121888" bIns="121888" rtlCol="0" anchor="t" anchorCtr="0">
-            <a:noAutofit/>
-          </a:bodyPr>
-          <a:lstStyle/>
-          <a:p>
-            <a:pPr algn="ctr">
-              <a:buSzPts val="5800"/>
-            </a:pPr>
-            <a:r>
-              <a:rPr lang="en-US" sz="3300" dirty="0"/>
-              <a:t>Data types</a:t>
-            </a:r>
-            <a:endParaRPr dirty="0"/>
-          </a:p>
-        </p:txBody>
-      </p:sp>
-      <p:sp>
-        <p:nvSpPr>
-          <p:cNvPr id="2" name="TextBox 1">
-            <a:extLst>
-              <a:ext uri="{FF2B5EF4-FFF2-40B4-BE49-F238E27FC236}">
-                <a16:creationId xmlns:a16="http://schemas.microsoft.com/office/drawing/2014/main" id="{1EA846E5-3D55-F441-907F-420B2B28B907}"/>
-              </a:ext>
-            </a:extLst>
-          </p:cNvPr>
-          <p:cNvSpPr txBox="1"/>
-          <p:nvPr/>
-        </p:nvSpPr>
-        <p:spPr>
-          <a:xfrm>
-            <a:off x="2460900" y="1197430"/>
-            <a:ext cx="9001758" cy="5909310"/>
+            <a:off x="2121853" y="365223"/>
+            <a:ext cx="9001758" cy="6463308"/>
           </a:xfrm>
           <a:prstGeom prst="rect">
             <a:avLst/>
@@ -5154,6 +5114,116 @@
           </a:p>
           <a:p>
             <a:endParaRPr lang="de-DE" dirty="0">
+              <a:latin typeface="Courier New" panose="02070309020205020404" pitchFamily="49" charset="0"/>
+              <a:cs typeface="Courier New" panose="02070309020205020404" pitchFamily="49" charset="0"/>
+            </a:endParaRPr>
+          </a:p>
+          <a:p>
+            <a:r>
+              <a:rPr lang="de-DE" b="1">
+                <a:latin typeface="Courier New" panose="02070309020205020404" pitchFamily="49" charset="0"/>
+                <a:cs typeface="Courier New" panose="02070309020205020404" pitchFamily="49" charset="0"/>
+              </a:rPr>
+              <a:t>24-bit RGB</a:t>
+            </a:r>
+            <a:endParaRPr lang="de-DE" b="1" dirty="0">
+              <a:latin typeface="Courier New" panose="02070309020205020404" pitchFamily="49" charset="0"/>
+              <a:cs typeface="Courier New" panose="02070309020205020404" pitchFamily="49" charset="0"/>
+            </a:endParaRPr>
+          </a:p>
+          <a:p>
+            <a:r>
+              <a:rPr lang="de-DE" dirty="0">
+                <a:solidFill>
+                  <a:srgbClr val="FF0000"/>
+                </a:solidFill>
+                <a:latin typeface="Courier New" panose="02070309020205020404" pitchFamily="49" charset="0"/>
+                <a:cs typeface="Courier New" panose="02070309020205020404" pitchFamily="49" charset="0"/>
+              </a:rPr>
+              <a:t>11111111</a:t>
+            </a:r>
+            <a:r>
+              <a:rPr lang="de-DE" dirty="0">
+                <a:solidFill>
+                  <a:srgbClr val="00B050"/>
+                </a:solidFill>
+                <a:latin typeface="Courier New" panose="02070309020205020404" pitchFamily="49" charset="0"/>
+                <a:cs typeface="Courier New" panose="02070309020205020404" pitchFamily="49" charset="0"/>
+              </a:rPr>
+              <a:t>00000000</a:t>
+            </a:r>
+            <a:r>
+              <a:rPr lang="de-DE" dirty="0">
+                <a:solidFill>
+                  <a:srgbClr val="0070C0"/>
+                </a:solidFill>
+                <a:latin typeface="Courier New" panose="02070309020205020404" pitchFamily="49" charset="0"/>
+                <a:cs typeface="Courier New" panose="02070309020205020404" pitchFamily="49" charset="0"/>
+              </a:rPr>
+              <a:t>01000000 </a:t>
+            </a:r>
+            <a:r>
+              <a:rPr lang="de-DE" dirty="0">
+                <a:latin typeface="Courier New" panose="02070309020205020404" pitchFamily="49" charset="0"/>
+                <a:cs typeface="Courier New" panose="02070309020205020404" pitchFamily="49" charset="0"/>
+              </a:rPr>
+              <a:t>= (</a:t>
+            </a:r>
+            <a:r>
+              <a:rPr lang="de-DE" dirty="0">
+                <a:solidFill>
+                  <a:srgbClr val="FF0000"/>
+                </a:solidFill>
+                <a:latin typeface="Courier New" panose="02070309020205020404" pitchFamily="49" charset="0"/>
+                <a:cs typeface="Courier New" panose="02070309020205020404" pitchFamily="49" charset="0"/>
+              </a:rPr>
+              <a:t>255</a:t>
+            </a:r>
+            <a:r>
+              <a:rPr lang="de-DE" dirty="0">
+                <a:latin typeface="Courier New" panose="02070309020205020404" pitchFamily="49" charset="0"/>
+                <a:cs typeface="Courier New" panose="02070309020205020404" pitchFamily="49" charset="0"/>
+              </a:rPr>
+              <a:t>,</a:t>
+            </a:r>
+            <a:r>
+              <a:rPr lang="de-DE" dirty="0">
+                <a:solidFill>
+                  <a:srgbClr val="00B050"/>
+                </a:solidFill>
+                <a:latin typeface="Courier New" panose="02070309020205020404" pitchFamily="49" charset="0"/>
+                <a:cs typeface="Courier New" panose="02070309020205020404" pitchFamily="49" charset="0"/>
+              </a:rPr>
+              <a:t>0</a:t>
+            </a:r>
+            <a:r>
+              <a:rPr lang="de-DE" dirty="0">
+                <a:latin typeface="Courier New" panose="02070309020205020404" pitchFamily="49" charset="0"/>
+                <a:cs typeface="Courier New" panose="02070309020205020404" pitchFamily="49" charset="0"/>
+              </a:rPr>
+              <a:t>,</a:t>
+            </a:r>
+            <a:r>
+              <a:rPr lang="de-DE" dirty="0">
+                <a:solidFill>
+                  <a:srgbClr val="0070C0"/>
+                </a:solidFill>
+                <a:latin typeface="Courier New" panose="02070309020205020404" pitchFamily="49" charset="0"/>
+                <a:cs typeface="Courier New" panose="02070309020205020404" pitchFamily="49" charset="0"/>
+              </a:rPr>
+              <a:t>64</a:t>
+            </a:r>
+            <a:r>
+              <a:rPr lang="de-DE" dirty="0">
+                <a:latin typeface="Courier New" panose="02070309020205020404" pitchFamily="49" charset="0"/>
+                <a:cs typeface="Courier New" panose="02070309020205020404" pitchFamily="49" charset="0"/>
+              </a:rPr>
+              <a:t>)</a:t>
+            </a:r>
+            <a:endParaRPr lang="de-DE" dirty="0">
+              <a:solidFill>
+                <a:srgbClr val="0070C0"/>
+              </a:solidFill>
               <a:latin typeface="Courier New" panose="02070309020205020404" pitchFamily="49" charset="0"/>
               <a:cs typeface="Courier New" panose="02070309020205020404" pitchFamily="49" charset="0"/>
             </a:endParaRPr>

</xml_diff>